<commit_message>
Updated Image Processing project from Spring 2012. Fixed race condition in comm.cpp where an asynchronous send was using a local variable that went out of scope before send completed, which resulted in garbage being sent for the block index in send segment.
</commit_message>
<xml_diff>
--- a/courses/image_processing/project/presentation/term_project.pptx
+++ b/courses/image_processing/project/presentation/term_project.pptx
@@ -10,8 +10,6 @@
     <p:sldId id="258" r:id="rId4"/>
     <p:sldId id="259" r:id="rId5"/>
     <p:sldId id="260" r:id="rId6"/>
-    <p:sldId id="261" r:id="rId7"/>
-    <p:sldId id="262" r:id="rId8"/>
   </p:sldIdLst>
   <p:sldSz cx="9144000" cy="6858000" type="screen4x3"/>
   <p:notesSz cx="6858000" cy="9144000"/>
@@ -307,7 +305,8 @@
           <a:p>
             <a:fld id="{44470CE1-9F58-4100-9998-B4D6C0145EBD}" type="datetimeFigureOut">
               <a:rPr lang="en-US" smtClean="0"/>
-              <a:t>4/26/2012</a:t>
+              <a:pPr/>
+              <a:t>4/27/2012</a:t>
             </a:fld>
             <a:endParaRPr lang="en-US"/>
           </a:p>
@@ -359,6 +358,7 @@
           <a:p>
             <a:fld id="{C2D1719E-314D-45F0-AD6C-19851ED3C844}" type="slidenum">
               <a:rPr lang="en-US" smtClean="0"/>
+              <a:pPr/>
               <a:t>‹#›</a:t>
             </a:fld>
             <a:endParaRPr lang="en-US"/>
@@ -660,7 +660,8 @@
           <a:p>
             <a:fld id="{44470CE1-9F58-4100-9998-B4D6C0145EBD}" type="datetimeFigureOut">
               <a:rPr lang="en-US" smtClean="0"/>
-              <a:t>4/26/2012</a:t>
+              <a:pPr/>
+              <a:t>4/27/2012</a:t>
             </a:fld>
             <a:endParaRPr lang="en-US"/>
           </a:p>
@@ -702,6 +703,7 @@
           <a:p>
             <a:fld id="{C2D1719E-314D-45F0-AD6C-19851ED3C844}" type="slidenum">
               <a:rPr lang="en-US" smtClean="0"/>
+              <a:pPr/>
               <a:t>‹#›</a:t>
             </a:fld>
             <a:endParaRPr lang="en-US"/>
@@ -835,7 +837,8 @@
           <a:p>
             <a:fld id="{44470CE1-9F58-4100-9998-B4D6C0145EBD}" type="datetimeFigureOut">
               <a:rPr lang="en-US" smtClean="0"/>
-              <a:t>4/26/2012</a:t>
+              <a:pPr/>
+              <a:t>4/27/2012</a:t>
             </a:fld>
             <a:endParaRPr lang="en-US"/>
           </a:p>
@@ -877,6 +880,7 @@
           <a:p>
             <a:fld id="{C2D1719E-314D-45F0-AD6C-19851ED3C844}" type="slidenum">
               <a:rPr lang="en-US" smtClean="0"/>
+              <a:pPr/>
               <a:t>‹#›</a:t>
             </a:fld>
             <a:endParaRPr lang="en-US"/>
@@ -948,7 +952,8 @@
           <a:p>
             <a:fld id="{44470CE1-9F58-4100-9998-B4D6C0145EBD}" type="datetimeFigureOut">
               <a:rPr lang="en-US" smtClean="0"/>
-              <a:t>4/26/2012</a:t>
+              <a:pPr/>
+              <a:t>4/27/2012</a:t>
             </a:fld>
             <a:endParaRPr lang="en-US"/>
           </a:p>
@@ -990,6 +995,7 @@
           <a:p>
             <a:fld id="{C2D1719E-314D-45F0-AD6C-19851ED3C844}" type="slidenum">
               <a:rPr lang="en-US" smtClean="0"/>
+              <a:pPr/>
               <a:t>‹#›</a:t>
             </a:fld>
             <a:endParaRPr lang="en-US"/>
@@ -1306,7 +1312,8 @@
           <a:p>
             <a:fld id="{44470CE1-9F58-4100-9998-B4D6C0145EBD}" type="datetimeFigureOut">
               <a:rPr lang="en-US" smtClean="0"/>
-              <a:t>4/26/2012</a:t>
+              <a:pPr/>
+              <a:t>4/27/2012</a:t>
             </a:fld>
             <a:endParaRPr lang="en-US"/>
           </a:p>
@@ -1500,6 +1507,7 @@
           <a:p>
             <a:fld id="{C2D1719E-314D-45F0-AD6C-19851ED3C844}" type="slidenum">
               <a:rPr lang="en-US" smtClean="0"/>
+              <a:pPr/>
               <a:t>‹#›</a:t>
             </a:fld>
             <a:endParaRPr lang="en-US"/>
@@ -1571,7 +1579,8 @@
           <a:p>
             <a:fld id="{44470CE1-9F58-4100-9998-B4D6C0145EBD}" type="datetimeFigureOut">
               <a:rPr lang="en-US" smtClean="0"/>
-              <a:t>4/26/2012</a:t>
+              <a:pPr/>
+              <a:t>4/27/2012</a:t>
             </a:fld>
             <a:endParaRPr lang="en-US"/>
           </a:p>
@@ -1613,6 +1622,7 @@
           <a:p>
             <a:fld id="{C2D1719E-314D-45F0-AD6C-19851ED3C844}" type="slidenum">
               <a:rPr lang="en-US" smtClean="0"/>
+              <a:pPr/>
               <a:t>‹#›</a:t>
             </a:fld>
             <a:endParaRPr lang="en-US"/>
@@ -1933,7 +1943,8 @@
           <a:p>
             <a:fld id="{44470CE1-9F58-4100-9998-B4D6C0145EBD}" type="datetimeFigureOut">
               <a:rPr lang="en-US" smtClean="0"/>
-              <a:t>4/26/2012</a:t>
+              <a:pPr/>
+              <a:t>4/27/2012</a:t>
             </a:fld>
             <a:endParaRPr lang="en-US"/>
           </a:p>
@@ -1975,6 +1986,7 @@
           <a:p>
             <a:fld id="{C2D1719E-314D-45F0-AD6C-19851ED3C844}" type="slidenum">
               <a:rPr lang="en-US" smtClean="0"/>
+              <a:pPr/>
               <a:t>‹#›</a:t>
             </a:fld>
             <a:endParaRPr lang="en-US"/>
@@ -2160,7 +2172,8 @@
           <a:p>
             <a:fld id="{44470CE1-9F58-4100-9998-B4D6C0145EBD}" type="datetimeFigureOut">
               <a:rPr lang="en-US" smtClean="0"/>
-              <a:t>4/26/2012</a:t>
+              <a:pPr/>
+              <a:t>4/27/2012</a:t>
             </a:fld>
             <a:endParaRPr lang="en-US"/>
           </a:p>
@@ -2202,6 +2215,7 @@
           <a:p>
             <a:fld id="{C2D1719E-314D-45F0-AD6C-19851ED3C844}" type="slidenum">
               <a:rPr lang="en-US" smtClean="0"/>
+              <a:pPr/>
               <a:t>‹#›</a:t>
             </a:fld>
             <a:endParaRPr lang="en-US"/>
@@ -2250,7 +2264,8 @@
           <a:p>
             <a:fld id="{44470CE1-9F58-4100-9998-B4D6C0145EBD}" type="datetimeFigureOut">
               <a:rPr lang="en-US" smtClean="0"/>
-              <a:t>4/26/2012</a:t>
+              <a:pPr/>
+              <a:t>4/27/2012</a:t>
             </a:fld>
             <a:endParaRPr lang="en-US"/>
           </a:p>
@@ -2292,6 +2307,7 @@
           <a:p>
             <a:fld id="{C2D1719E-314D-45F0-AD6C-19851ED3C844}" type="slidenum">
               <a:rPr lang="en-US" smtClean="0"/>
+              <a:pPr/>
               <a:t>‹#›</a:t>
             </a:fld>
             <a:endParaRPr lang="en-US"/>
@@ -2517,7 +2533,8 @@
           <a:p>
             <a:fld id="{44470CE1-9F58-4100-9998-B4D6C0145EBD}" type="datetimeFigureOut">
               <a:rPr lang="en-US" smtClean="0"/>
-              <a:t>4/26/2012</a:t>
+              <a:pPr/>
+              <a:t>4/27/2012</a:t>
             </a:fld>
             <a:endParaRPr lang="en-US"/>
           </a:p>
@@ -2559,6 +2576,7 @@
           <a:p>
             <a:fld id="{C2D1719E-314D-45F0-AD6C-19851ED3C844}" type="slidenum">
               <a:rPr lang="en-US" smtClean="0"/>
+              <a:pPr/>
               <a:t>‹#›</a:t>
             </a:fld>
             <a:endParaRPr lang="en-US"/>
@@ -2745,7 +2763,8 @@
           <a:p>
             <a:fld id="{44470CE1-9F58-4100-9998-B4D6C0145EBD}" type="datetimeFigureOut">
               <a:rPr lang="en-US" smtClean="0"/>
-              <a:t>4/26/2012</a:t>
+              <a:pPr/>
+              <a:t>4/27/2012</a:t>
             </a:fld>
             <a:endParaRPr lang="en-US"/>
           </a:p>
@@ -2797,6 +2816,7 @@
           <a:p>
             <a:fld id="{C2D1719E-314D-45F0-AD6C-19851ED3C844}" type="slidenum">
               <a:rPr lang="en-US" smtClean="0"/>
+              <a:pPr/>
               <a:t>‹#›</a:t>
             </a:fld>
             <a:endParaRPr lang="en-US"/>
@@ -3244,7 +3264,8 @@
           <a:p>
             <a:fld id="{44470CE1-9F58-4100-9998-B4D6C0145EBD}" type="datetimeFigureOut">
               <a:rPr lang="en-US" smtClean="0"/>
-              <a:t>4/26/2012</a:t>
+              <a:pPr/>
+              <a:t>4/27/2012</a:t>
             </a:fld>
             <a:endParaRPr lang="en-US"/>
           </a:p>
@@ -3326,6 +3347,7 @@
           <a:p>
             <a:fld id="{C2D1719E-314D-45F0-AD6C-19851ED3C844}" type="slidenum">
               <a:rPr lang="en-US" smtClean="0"/>
+              <a:pPr/>
               <a:t>‹#›</a:t>
             </a:fld>
             <a:endParaRPr lang="en-US"/>
@@ -3774,7 +3796,23 @@
           <a:p>
             <a:r>
               <a:rPr lang="en-US" dirty="0" smtClean="0"/>
-              <a:t>Find interest points</a:t>
+              <a:t>Integral Images</a:t>
+            </a:r>
+          </a:p>
+          <a:p>
+            <a:pPr>
+              <a:buNone/>
+            </a:pPr>
+            <a:endParaRPr lang="en-US" dirty="0" smtClean="0"/>
+          </a:p>
+          <a:p>
+            <a:r>
+              <a:rPr lang="en-US" dirty="0" smtClean="0"/>
+              <a:t>Find </a:t>
+            </a:r>
+            <a:r>
+              <a:rPr lang="en-US" dirty="0" smtClean="0"/>
+              <a:t>interest points</a:t>
             </a:r>
           </a:p>
           <a:p>
@@ -3863,25 +3901,27 @@
         </p:nvPicPr>
         <p:blipFill>
           <a:blip r:embed="rId2" cstate="print"/>
-          <a:srcRect b="11129"/>
+          <a:srcRect l="-804" b="11107"/>
           <a:stretch>
             <a:fillRect/>
           </a:stretch>
         </p:blipFill>
         <p:spPr>
           <a:xfrm rot="5400000">
-            <a:off x="-446025" y="3211577"/>
-            <a:ext cx="4648201" cy="1425447"/>
+            <a:off x="437777" y="3143626"/>
+            <a:ext cx="3779836" cy="1150189"/>
           </a:xfrm>
         </p:spPr>
       </p:pic>
       <p:pic>
         <p:nvPicPr>
-          <p:cNvPr id="5" name="Picture 4" descr="chapel2_interest_points.jpg"/>
+          <p:cNvPr id="7" name="Content Placeholder 6" descr="med_degen_Det_Hess_21x21.jpg"/>
           <p:cNvPicPr>
-            <a:picLocks noChangeAspect="1"/>
+            <a:picLocks noGrp="1" noChangeAspect="1"/>
           </p:cNvPicPr>
-          <p:nvPr/>
+          <p:nvPr>
+            <p:ph sz="quarter" idx="2"/>
+          </p:nvPr>
         </p:nvPicPr>
         <p:blipFill>
           <a:blip r:embed="rId3" cstate="print"/>
@@ -3891,12 +3931,9 @@
         </p:blipFill>
         <p:spPr>
           <a:xfrm>
-            <a:off x="4032092" y="1600200"/>
-            <a:ext cx="3892708" cy="4648200"/>
-          </a:xfrm>
-          <a:prstGeom prst="rect">
-            <a:avLst/>
-          </a:prstGeom>
+            <a:off x="4343400" y="2329022"/>
+            <a:ext cx="3749675" cy="2809555"/>
+          </a:xfrm>
         </p:spPr>
       </p:pic>
     </p:spTree>
@@ -4016,7 +4053,15 @@
           <a:p>
             <a:r>
               <a:rPr lang="en-US" dirty="0" smtClean="0"/>
-              <a:t>Max window sum is orientation</a:t>
+              <a:t>Max </a:t>
+            </a:r>
+            <a:r>
+              <a:rPr lang="en-US" dirty="0" smtClean="0"/>
+              <a:t>gradient </a:t>
+            </a:r>
+            <a:r>
+              <a:rPr lang="en-US" dirty="0" smtClean="0"/>
+              <a:t>sum is orientation</a:t>
             </a:r>
             <a:endParaRPr lang="en-US" dirty="0"/>
           </a:p>
@@ -4088,152 +4133,31 @@
         </p:blipFill>
         <p:spPr>
           <a:xfrm>
-            <a:off x="1600200" y="1811359"/>
-            <a:ext cx="5701904" cy="3522641"/>
+            <a:off x="1243658" y="2778940"/>
+            <a:ext cx="3091158" cy="1909720"/>
           </a:xfrm>
         </p:spPr>
       </p:pic>
-    </p:spTree>
-  </p:cSld>
-  <p:clrMapOvr>
-    <a:masterClrMapping/>
-  </p:clrMapOvr>
-</p:sld>
-</file>
-
-<file path=ppt/slides/slide6.xml><?xml version="1.0" encoding="utf-8"?>
-<p:sld xmlns:a="http://schemas.openxmlformats.org/drawingml/2006/main" xmlns:r="http://schemas.openxmlformats.org/officeDocument/2006/relationships" xmlns:p="http://schemas.openxmlformats.org/presentationml/2006/main">
-  <p:cSld>
-    <p:spTree>
-      <p:nvGrpSpPr>
-        <p:cNvPr id="1" name=""/>
-        <p:cNvGrpSpPr/>
-        <p:nvPr/>
-      </p:nvGrpSpPr>
-      <p:grpSpPr>
-        <a:xfrm>
-          <a:off x="0" y="0"/>
-          <a:ext cx="0" cy="0"/>
-          <a:chOff x="0" y="0"/>
-          <a:chExt cx="0" cy="0"/>
-        </a:xfrm>
-      </p:grpSpPr>
-      <p:sp>
-        <p:nvSpPr>
-          <p:cNvPr id="2" name="Title 1"/>
-          <p:cNvSpPr>
-            <a:spLocks noGrp="1"/>
-          </p:cNvSpPr>
-          <p:nvPr>
-            <p:ph type="title"/>
-          </p:nvPr>
-        </p:nvSpPr>
-        <p:spPr/>
-        <p:txBody>
-          <a:bodyPr>
-            <a:normAutofit fontScale="90000"/>
-          </a:bodyPr>
-          <a:lstStyle/>
-          <a:p>
-            <a:r>
-              <a:rPr lang="en-US" dirty="0" smtClean="0"/>
-              <a:t>Determinant of Hessian Approximation</a:t>
-            </a:r>
-            <a:endParaRPr lang="en-US" dirty="0"/>
-          </a:p>
-        </p:txBody>
-      </p:sp>
       <p:pic>
         <p:nvPicPr>
-          <p:cNvPr id="4" name="Content Placeholder 3" descr="med_degen_Det_Hess_15x15.jpg"/>
+          <p:cNvPr id="6" name="Content Placeholder 5" descr="chapel2_interest_points.jpg"/>
           <p:cNvPicPr>
             <a:picLocks noGrp="1" noChangeAspect="1"/>
           </p:cNvPicPr>
           <p:nvPr>
-            <p:ph sz="quarter" idx="1"/>
+            <p:ph sz="quarter" idx="2"/>
           </p:nvPr>
         </p:nvPicPr>
         <p:blipFill>
-          <a:blip r:embed="rId2" cstate="print"/>
+          <a:blip r:embed="rId3" cstate="print"/>
           <a:stretch>
             <a:fillRect/>
           </a:stretch>
         </p:blipFill>
         <p:spPr>
           <a:xfrm>
-            <a:off x="1749669" y="1447800"/>
-            <a:ext cx="6101862" cy="4572000"/>
-          </a:xfrm>
-        </p:spPr>
-      </p:pic>
-    </p:spTree>
-  </p:cSld>
-  <p:clrMapOvr>
-    <a:masterClrMapping/>
-  </p:clrMapOvr>
-</p:sld>
-</file>
-
-<file path=ppt/slides/slide7.xml><?xml version="1.0" encoding="utf-8"?>
-<p:sld xmlns:a="http://schemas.openxmlformats.org/drawingml/2006/main" xmlns:r="http://schemas.openxmlformats.org/officeDocument/2006/relationships" xmlns:p="http://schemas.openxmlformats.org/presentationml/2006/main">
-  <p:cSld>
-    <p:spTree>
-      <p:nvGrpSpPr>
-        <p:cNvPr id="1" name=""/>
-        <p:cNvGrpSpPr/>
-        <p:nvPr/>
-      </p:nvGrpSpPr>
-      <p:grpSpPr>
-        <a:xfrm>
-          <a:off x="0" y="0"/>
-          <a:ext cx="0" cy="0"/>
-          <a:chOff x="0" y="0"/>
-          <a:chExt cx="0" cy="0"/>
-        </a:xfrm>
-      </p:grpSpPr>
-      <p:sp>
-        <p:nvSpPr>
-          <p:cNvPr id="2" name="Title 1"/>
-          <p:cNvSpPr>
-            <a:spLocks noGrp="1"/>
-          </p:cNvSpPr>
-          <p:nvPr>
-            <p:ph type="title"/>
-          </p:nvPr>
-        </p:nvSpPr>
-        <p:spPr/>
-        <p:txBody>
-          <a:bodyPr/>
-          <a:lstStyle/>
-          <a:p>
-            <a:r>
-              <a:rPr lang="en-US" dirty="0" smtClean="0"/>
-              <a:t>Orientation Vectors?</a:t>
-            </a:r>
-            <a:endParaRPr lang="en-US" dirty="0"/>
-          </a:p>
-        </p:txBody>
-      </p:sp>
-      <p:pic>
-        <p:nvPicPr>
-          <p:cNvPr id="6" name="Content Placeholder 5" descr="dot.jpg"/>
-          <p:cNvPicPr>
-            <a:picLocks noGrp="1" noChangeAspect="1"/>
-          </p:cNvPicPr>
-          <p:nvPr>
-            <p:ph sz="quarter" idx="1"/>
-          </p:nvPr>
-        </p:nvPicPr>
-        <p:blipFill>
-          <a:blip r:embed="rId2" cstate="print"/>
-          <a:stretch>
-            <a:fillRect/>
-          </a:stretch>
-        </p:blipFill>
-        <p:spPr>
-          <a:xfrm>
-            <a:off x="914400" y="1547812"/>
-            <a:ext cx="7772400" cy="4371975"/>
+            <a:off x="4933950" y="1495096"/>
+            <a:ext cx="3749675" cy="4477408"/>
           </a:xfrm>
         </p:spPr>
       </p:pic>

</xml_diff>